<commit_message>
adding a power point presentation
</commit_message>
<xml_diff>
--- a/START WITH WHY!.pptx
+++ b/START WITH WHY!.pptx
@@ -4025,6 +4025,13 @@
   <p:clrMapOvr>
     <a:masterClrMapping/>
   </p:clrMapOvr>
+  <p:timing>
+    <p:tnLst>
+      <p:par>
+        <p:cTn id="1" dur="indefinite" restart="never" nodeType="tmRoot"/>
+      </p:par>
+    </p:tnLst>
+  </p:timing>
 </p:sld>
 </file>
 
@@ -4171,6 +4178,13 @@
   <p:clrMapOvr>
     <a:masterClrMapping/>
   </p:clrMapOvr>
+  <p:timing>
+    <p:tnLst>
+      <p:par>
+        <p:cTn id="1" dur="indefinite" restart="never" nodeType="tmRoot"/>
+      </p:par>
+    </p:tnLst>
+  </p:timing>
 </p:sld>
 </file>
 
@@ -4291,6 +4305,13 @@
   <p:clrMapOvr>
     <a:masterClrMapping/>
   </p:clrMapOvr>
+  <p:timing>
+    <p:tnLst>
+      <p:par>
+        <p:cTn id="1" dur="indefinite" restart="never" nodeType="tmRoot"/>
+      </p:par>
+    </p:tnLst>
+  </p:timing>
 </p:sld>
 </file>
 
@@ -4452,6 +4473,13 @@
   <p:clrMapOvr>
     <a:masterClrMapping/>
   </p:clrMapOvr>
+  <p:timing>
+    <p:tnLst>
+      <p:par>
+        <p:cTn id="1" dur="indefinite" restart="never" nodeType="tmRoot"/>
+      </p:par>
+    </p:tnLst>
+  </p:timing>
 </p:sld>
 </file>
 
@@ -4567,6 +4595,13 @@
   <p:clrMapOvr>
     <a:masterClrMapping/>
   </p:clrMapOvr>
+  <p:timing>
+    <p:tnLst>
+      <p:par>
+        <p:cTn id="1" dur="indefinite" restart="never" nodeType="tmRoot"/>
+      </p:par>
+    </p:tnLst>
+  </p:timing>
 </p:sld>
 </file>
 
@@ -4660,6 +4695,13 @@
   <p:clrMapOvr>
     <a:masterClrMapping/>
   </p:clrMapOvr>
+  <p:timing>
+    <p:tnLst>
+      <p:par>
+        <p:cTn id="1" dur="indefinite" restart="never" nodeType="tmRoot"/>
+      </p:par>
+    </p:tnLst>
+  </p:timing>
 </p:sld>
 </file>
 
@@ -4848,6 +4890,13 @@
   <p:clrMapOvr>
     <a:masterClrMapping/>
   </p:clrMapOvr>
+  <p:timing>
+    <p:tnLst>
+      <p:par>
+        <p:cTn id="1" dur="indefinite" restart="never" nodeType="tmRoot"/>
+      </p:par>
+    </p:tnLst>
+  </p:timing>
 </p:sld>
 </file>
 

</xml_diff>